<commit_message>
GUI Component table updated.
</commit_message>
<xml_diff>
--- a/Test Plan Presentation/Team Ink3d Test Plan.pptx
+++ b/Test Plan Presentation/Team Ink3d Test Plan.pptx
@@ -158,7 +158,7 @@
   </p:defaultTextStyle>
   <p:extLst>
     <p:ext uri="{EFAFB233-063F-42B5-8137-9DF3F51BA10A}">
-      <p15:sldGuideLst xmlns:p15="http://schemas.microsoft.com/office/powerpoint/2012/main" xmlns="">
+      <p15:sldGuideLst xmlns:p15="http://schemas.microsoft.com/office/powerpoint/2012/main">
         <p15:guide id="1" orient="horz" pos="2160">
           <p15:clr>
             <a:srgbClr val="A4A3A4"/>
@@ -257,7 +257,7 @@
           <a:p>
             <a:fld id="{53C8B938-9E0C-4F25-92CE-3A21ABD891F9}" type="datetimeFigureOut">
               <a:rPr lang="en-US" smtClean="0"/>
-              <a:t>3/16/2014</a:t>
+              <a:t>3/18/2014</a:t>
             </a:fld>
             <a:endParaRPr lang="en-US"/>
           </a:p>
@@ -803,7 +803,7 @@
           <a:p>
             <a:fld id="{8FF4DA45-B795-4CB0-B3BB-6A487B8C4B48}" type="datetimeFigureOut">
               <a:rPr lang="en-US" smtClean="0"/>
-              <a:t>3/16/2014</a:t>
+              <a:t>3/18/2014</a:t>
             </a:fld>
             <a:endParaRPr lang="en-US"/>
           </a:p>
@@ -968,7 +968,7 @@
           <a:p>
             <a:fld id="{8FF4DA45-B795-4CB0-B3BB-6A487B8C4B48}" type="datetimeFigureOut">
               <a:rPr lang="en-US" smtClean="0"/>
-              <a:t>3/16/2014</a:t>
+              <a:t>3/18/2014</a:t>
             </a:fld>
             <a:endParaRPr lang="en-US"/>
           </a:p>
@@ -1143,7 +1143,7 @@
           <a:p>
             <a:fld id="{8FF4DA45-B795-4CB0-B3BB-6A487B8C4B48}" type="datetimeFigureOut">
               <a:rPr lang="en-US" smtClean="0"/>
-              <a:t>3/16/2014</a:t>
+              <a:t>3/18/2014</a:t>
             </a:fld>
             <a:endParaRPr lang="en-US"/>
           </a:p>
@@ -1308,7 +1308,7 @@
           <a:p>
             <a:fld id="{8FF4DA45-B795-4CB0-B3BB-6A487B8C4B48}" type="datetimeFigureOut">
               <a:rPr lang="en-US" smtClean="0"/>
-              <a:t>3/16/2014</a:t>
+              <a:t>3/18/2014</a:t>
             </a:fld>
             <a:endParaRPr lang="en-US"/>
           </a:p>
@@ -1549,7 +1549,7 @@
           <a:p>
             <a:fld id="{8FF4DA45-B795-4CB0-B3BB-6A487B8C4B48}" type="datetimeFigureOut">
               <a:rPr lang="en-US" smtClean="0"/>
-              <a:t>3/16/2014</a:t>
+              <a:t>3/18/2014</a:t>
             </a:fld>
             <a:endParaRPr lang="en-US"/>
           </a:p>
@@ -1832,7 +1832,7 @@
           <a:p>
             <a:fld id="{8FF4DA45-B795-4CB0-B3BB-6A487B8C4B48}" type="datetimeFigureOut">
               <a:rPr lang="en-US" smtClean="0"/>
-              <a:t>3/16/2014</a:t>
+              <a:t>3/18/2014</a:t>
             </a:fld>
             <a:endParaRPr lang="en-US"/>
           </a:p>
@@ -2261,7 +2261,7 @@
           <a:p>
             <a:fld id="{8FF4DA45-B795-4CB0-B3BB-6A487B8C4B48}" type="datetimeFigureOut">
               <a:rPr lang="en-US" smtClean="0"/>
-              <a:t>3/16/2014</a:t>
+              <a:t>3/18/2014</a:t>
             </a:fld>
             <a:endParaRPr lang="en-US"/>
           </a:p>
@@ -2374,7 +2374,7 @@
           <a:p>
             <a:fld id="{8FF4DA45-B795-4CB0-B3BB-6A487B8C4B48}" type="datetimeFigureOut">
               <a:rPr lang="en-US" smtClean="0"/>
-              <a:t>3/16/2014</a:t>
+              <a:t>3/18/2014</a:t>
             </a:fld>
             <a:endParaRPr lang="en-US"/>
           </a:p>
@@ -2464,7 +2464,7 @@
           <a:p>
             <a:fld id="{8FF4DA45-B795-4CB0-B3BB-6A487B8C4B48}" type="datetimeFigureOut">
               <a:rPr lang="en-US" smtClean="0"/>
-              <a:t>3/16/2014</a:t>
+              <a:t>3/18/2014</a:t>
             </a:fld>
             <a:endParaRPr lang="en-US"/>
           </a:p>
@@ -2653,7 +2653,7 @@
           <a:p>
             <a:fld id="{8FF4DA45-B795-4CB0-B3BB-6A487B8C4B48}" type="datetimeFigureOut">
               <a:rPr lang="en-US" smtClean="0"/>
-              <a:t>3/16/2014</a:t>
+              <a:t>3/18/2014</a:t>
             </a:fld>
             <a:endParaRPr lang="en-US"/>
           </a:p>
@@ -2971,7 +2971,7 @@
           <a:p>
             <a:fld id="{8FF4DA45-B795-4CB0-B3BB-6A487B8C4B48}" type="datetimeFigureOut">
               <a:rPr lang="en-US" smtClean="0"/>
-              <a:t>3/16/2014</a:t>
+              <a:t>3/18/2014</a:t>
             </a:fld>
             <a:endParaRPr lang="en-US"/>
           </a:p>
@@ -3350,7 +3350,7 @@
           <a:p>
             <a:fld id="{8FF4DA45-B795-4CB0-B3BB-6A487B8C4B48}" type="datetimeFigureOut">
               <a:rPr lang="en-US" smtClean="0"/>
-              <a:t>3/16/2014</a:t>
+              <a:t>3/18/2014</a:t>
             </a:fld>
             <a:endParaRPr lang="en-US"/>
           </a:p>
@@ -4427,12 +4427,12 @@
           <a:graphicData uri="http://schemas.openxmlformats.org/presentationml/2006/ole">
             <mc:AlternateContent xmlns:mc="http://schemas.openxmlformats.org/markup-compatibility/2006">
               <mc:Choice xmlns:v="urn:schemas-microsoft-com:vml" Requires="v">
-                <p:oleObj spid="_x0000_s11275" name="Visio" r:id="rId3" imgW="7572367" imgH="8496360" progId="Visio.Drawing.15">
+                <p:oleObj spid="_x0000_s11276" name="Visio" r:id="rId4" imgW="7572367" imgH="8496360" progId="Visio.Drawing.15">
                   <p:embed/>
                 </p:oleObj>
               </mc:Choice>
               <mc:Fallback>
-                <p:oleObj name="Visio" r:id="rId3" imgW="7572367" imgH="8496360" progId="Visio.Drawing.15">
+                <p:oleObj name="Visio" r:id="rId4" imgW="7572367" imgH="8496360" progId="Visio.Drawing.15">
                   <p:embed/>
                   <p:pic>
                     <p:nvPicPr>
@@ -4443,7 +4443,7 @@
                       <p:nvPr/>
                     </p:nvPicPr>
                     <p:blipFill>
-                      <a:blip r:embed="rId4">
+                      <a:blip r:embed="rId5">
                         <a:extLst>
                           <a:ext uri="{28A0092B-C50C-407E-A947-70E740481C1C}">
                             <a14:useLocalDpi xmlns:a14="http://schemas.microsoft.com/office/drawing/2010/main" val="0"/>
@@ -9646,11 +9646,7 @@
           <a:p>
             <a:r>
               <a:rPr lang="en-US" dirty="0" smtClean="0"/>
-              <a:t>Detail Design </a:t>
-            </a:r>
-            <a:r>
-              <a:rPr lang="en-US" dirty="0" smtClean="0"/>
-              <a:t>Overview</a:t>
+              <a:t>Detail Design Overview</a:t>
             </a:r>
           </a:p>
           <a:p>
@@ -9662,7 +9658,6 @@
               <a:rPr lang="en-US" dirty="0" smtClean="0"/>
               <a:t>Strategy</a:t>
             </a:r>
-            <a:endParaRPr lang="en-US" dirty="0" smtClean="0"/>
           </a:p>
           <a:p>
             <a:r>
@@ -9685,21 +9680,13 @@
           <a:p>
             <a:r>
               <a:rPr lang="en-US" dirty="0" smtClean="0"/>
-              <a:t>Features Not </a:t>
+              <a:t>Features Not Tested</a:t>
             </a:r>
+          </a:p>
+          <a:p>
             <a:r>
               <a:rPr lang="en-US" dirty="0" smtClean="0"/>
-              <a:t>Tested</a:t>
-            </a:r>
-          </a:p>
-          <a:p>
-            <a:r>
-              <a:rPr lang="en-US" dirty="0" smtClean="0"/>
-              <a:t>Test </a:t>
-            </a:r>
-            <a:r>
-              <a:rPr lang="en-US" dirty="0" smtClean="0"/>
-              <a:t>Deliverables</a:t>
+              <a:t>Test Deliverables</a:t>
             </a:r>
           </a:p>
           <a:p>
@@ -15228,14 +15215,14 @@
           <p:nvPr>
             <p:extLst>
               <p:ext uri="{D42A27DB-BD31-4B8C-83A1-F6EECF244321}">
-                <p14:modId xmlns:p14="http://schemas.microsoft.com/office/powerpoint/2010/main" val="1690010020"/>
+                <p14:modId xmlns:p14="http://schemas.microsoft.com/office/powerpoint/2010/main" val="1651794955"/>
               </p:ext>
             </p:extLst>
           </p:nvPr>
         </p:nvGraphicFramePr>
         <p:xfrm>
           <a:off x="628650" y="2331076"/>
-          <a:ext cx="7886700" cy="2048256"/>
+          <a:ext cx="7886700" cy="1728515"/>
         </p:xfrm>
         <a:graphic>
           <a:graphicData uri="http://schemas.openxmlformats.org/drawingml/2006/table">
@@ -15504,7 +15491,7 @@
                         <a:buChar char=""/>
                       </a:pPr>
                       <a:r>
-                        <a:rPr lang="en-US" sz="1600">
+                        <a:rPr lang="en-US" sz="1600" dirty="0">
                           <a:effectLst/>
                         </a:rPr>
                         <a:t>Updates display with correct results</a:t>
@@ -15525,12 +15512,42 @@
                         <a:buChar char=""/>
                       </a:pPr>
                       <a:r>
-                        <a:rPr lang="en-US" sz="1600">
-                          <a:effectLst/>
-                        </a:rPr>
-                        <a:t>Navigating between menus is easy. (This output is subjective)</a:t>
-                      </a:r>
-                      <a:endParaRPr lang="en-US" sz="1600">
+                        <a:rPr lang="en-US" sz="1600" dirty="0" smtClean="0">
+                          <a:solidFill>
+                            <a:schemeClr val="dk1"/>
+                          </a:solidFill>
+                          <a:effectLst/>
+                          <a:latin typeface="+mn-lt"/>
+                          <a:ea typeface="+mn-ea"/>
+                          <a:cs typeface="+mn-cs"/>
+                        </a:rPr>
+                        <a:t>Correctly</a:t>
+                      </a:r>
+                      <a:r>
+                        <a:rPr lang="en-US" sz="1600" baseline="0" dirty="0" smtClean="0">
+                          <a:solidFill>
+                            <a:schemeClr val="dk1"/>
+                          </a:solidFill>
+                          <a:effectLst/>
+                          <a:latin typeface="+mn-lt"/>
+                          <a:ea typeface="+mn-ea"/>
+                          <a:cs typeface="+mn-cs"/>
+                        </a:rPr>
+                        <a:t> </a:t>
+                      </a:r>
+                      <a:r>
+                        <a:rPr lang="en-US" sz="1600" baseline="0" smtClean="0">
+                          <a:solidFill>
+                            <a:schemeClr val="dk1"/>
+                          </a:solidFill>
+                          <a:effectLst/>
+                          <a:latin typeface="+mn-lt"/>
+                          <a:ea typeface="+mn-ea"/>
+                          <a:cs typeface="+mn-cs"/>
+                        </a:rPr>
+                        <a:t>switches menus</a:t>
+                      </a:r>
+                      <a:endParaRPr lang="en-US" sz="1600" dirty="0">
                         <a:solidFill>
                           <a:srgbClr val="2F5496"/>
                         </a:solidFill>
@@ -22562,8 +22579,23 @@
                           <a:ea typeface="+mn-ea"/>
                           <a:cs typeface="+mn-cs"/>
                         </a:rPr>
-                        <a:t>Compiled </a:t>
-                      </a:r>
+                        <a:t>Compiled G-Code (Post Processing Layer)</a:t>
+                      </a:r>
+                    </a:p>
+                    <a:p>
+                      <a:pPr marL="342900" marR="0" lvl="0" indent="-342900" algn="l" defTabSz="914400" rtl="0" eaLnBrk="1" latinLnBrk="0" hangingPunct="1">
+                        <a:lnSpc>
+                          <a:spcPct val="105000"/>
+                        </a:lnSpc>
+                        <a:spcBef>
+                          <a:spcPts val="0"/>
+                        </a:spcBef>
+                        <a:spcAft>
+                          <a:spcPts val="0"/>
+                        </a:spcAft>
+                        <a:buFont typeface="Symbol" panose="05050102010706020507" pitchFamily="18" charset="2"/>
+                        <a:buChar char=""/>
+                      </a:pPr>
                       <a:r>
                         <a:rPr lang="en-US" sz="1600" kern="1200" dirty="0" smtClean="0">
                           <a:solidFill>
@@ -22574,45 +22606,6 @@
                           <a:ea typeface="+mn-ea"/>
                           <a:cs typeface="+mn-cs"/>
                         </a:rPr>
-                        <a:t>G-Code </a:t>
-                      </a:r>
-                      <a:r>
-                        <a:rPr lang="en-US" sz="1600" kern="1200" dirty="0" smtClean="0">
-                          <a:solidFill>
-                            <a:schemeClr val="dk1"/>
-                          </a:solidFill>
-                          <a:effectLst/>
-                          <a:latin typeface="+mn-lt"/>
-                          <a:ea typeface="+mn-ea"/>
-                          <a:cs typeface="+mn-cs"/>
-                        </a:rPr>
-                        <a:t>(Post Processing Layer)</a:t>
-                      </a:r>
-                    </a:p>
-                    <a:p>
-                      <a:pPr marL="342900" marR="0" lvl="0" indent="-342900" algn="l" defTabSz="914400" rtl="0" eaLnBrk="1" latinLnBrk="0" hangingPunct="1">
-                        <a:lnSpc>
-                          <a:spcPct val="105000"/>
-                        </a:lnSpc>
-                        <a:spcBef>
-                          <a:spcPts val="0"/>
-                        </a:spcBef>
-                        <a:spcAft>
-                          <a:spcPts val="0"/>
-                        </a:spcAft>
-                        <a:buFont typeface="Symbol" panose="05050102010706020507" pitchFamily="18" charset="2"/>
-                        <a:buChar char=""/>
-                      </a:pPr>
-                      <a:r>
-                        <a:rPr lang="en-US" sz="1600" kern="1200" dirty="0" smtClean="0">
-                          <a:solidFill>
-                            <a:schemeClr val="dk1"/>
-                          </a:solidFill>
-                          <a:effectLst/>
-                          <a:latin typeface="+mn-lt"/>
-                          <a:ea typeface="+mn-ea"/>
-                          <a:cs typeface="+mn-cs"/>
-                        </a:rPr>
                         <a:t>Stream </a:t>
                       </a:r>
                       <a:r>
@@ -22625,19 +22618,7 @@
                           <a:ea typeface="+mn-ea"/>
                           <a:cs typeface="+mn-cs"/>
                         </a:rPr>
-                        <a:t>of </a:t>
-                      </a:r>
-                      <a:r>
-                        <a:rPr lang="en-US" sz="1600" kern="1200" smtClean="0">
-                          <a:solidFill>
-                            <a:schemeClr val="dk1"/>
-                          </a:solidFill>
-                          <a:effectLst/>
-                          <a:latin typeface="+mn-lt"/>
-                          <a:ea typeface="+mn-ea"/>
-                          <a:cs typeface="+mn-cs"/>
-                        </a:rPr>
-                        <a:t>G-Codes </a:t>
+                        <a:t>of G-Codes </a:t>
                       </a:r>
                       <a:r>
                         <a:rPr lang="en-US" sz="1600" kern="1200" dirty="0" smtClean="0">
@@ -36017,12 +35998,12 @@
           <a:graphicData uri="http://schemas.openxmlformats.org/presentationml/2006/ole">
             <mc:AlternateContent xmlns:mc="http://schemas.openxmlformats.org/markup-compatibility/2006">
               <mc:Choice xmlns:v="urn:schemas-microsoft-com:vml" Requires="v">
-                <p:oleObj spid="_x0000_s9246" name="Visio" r:id="rId3" imgW="7343730" imgH="9410580" progId="Visio.Drawing.15">
+                <p:oleObj spid="_x0000_s9247" name="Visio" r:id="rId4" imgW="7343730" imgH="9410580" progId="Visio.Drawing.15">
                   <p:embed/>
                 </p:oleObj>
               </mc:Choice>
               <mc:Fallback>
-                <p:oleObj name="Visio" r:id="rId3" imgW="7343730" imgH="9410580" progId="Visio.Drawing.15">
+                <p:oleObj name="Visio" r:id="rId4" imgW="7343730" imgH="9410580" progId="Visio.Drawing.15">
                   <p:embed/>
                   <p:pic>
                     <p:nvPicPr>
@@ -36033,7 +36014,7 @@
                       <p:nvPr/>
                     </p:nvPicPr>
                     <p:blipFill>
-                      <a:blip r:embed="rId4"/>
+                      <a:blip r:embed="rId5"/>
                       <a:srcRect/>
                       <a:stretch>
                         <a:fillRect/>
@@ -36373,12 +36354,12 @@
           <a:graphicData uri="http://schemas.openxmlformats.org/presentationml/2006/ole">
             <mc:AlternateContent xmlns:mc="http://schemas.openxmlformats.org/markup-compatibility/2006">
               <mc:Choice xmlns:v="urn:schemas-microsoft-com:vml" Requires="v">
-                <p:oleObj spid="_x0000_s10271" name="Visio" r:id="rId3" imgW="7534278" imgH="9677340" progId="Visio.Drawing.15">
+                <p:oleObj spid="_x0000_s10272" name="Visio" r:id="rId4" imgW="7534278" imgH="9677340" progId="Visio.Drawing.15">
                   <p:embed/>
                 </p:oleObj>
               </mc:Choice>
               <mc:Fallback>
-                <p:oleObj name="Visio" r:id="rId3" imgW="7534278" imgH="9677340" progId="Visio.Drawing.15">
+                <p:oleObj name="Visio" r:id="rId4" imgW="7534278" imgH="9677340" progId="Visio.Drawing.15">
                   <p:embed/>
                   <p:pic>
                     <p:nvPicPr>
@@ -36389,7 +36370,7 @@
                       <p:nvPr/>
                     </p:nvPicPr>
                     <p:blipFill>
-                      <a:blip r:embed="rId4">
+                      <a:blip r:embed="rId5">
                         <a:extLst>
                           <a:ext uri="{28A0092B-C50C-407E-A947-70E740481C1C}">
                             <a14:useLocalDpi xmlns:a14="http://schemas.microsoft.com/office/drawing/2010/main" val="0"/>

</xml_diff>